<commit_message>
uodate new file session 2
</commit_message>
<xml_diff>
--- a/CCi/poweroint/session2.pptx
+++ b/CCi/poweroint/session2.pptx
@@ -4,6 +4,9 @@
   <p:sldMasterIdLst>
     <p:sldMasterId id="2147483695" r:id="rId1"/>
   </p:sldMasterIdLst>
+  <p:notesMasterIdLst>
+    <p:notesMasterId r:id="rId8"/>
+  </p:notesMasterIdLst>
   <p:sldIdLst>
     <p:sldId id="256" r:id="rId2"/>
     <p:sldId id="257" r:id="rId3"/>
@@ -14,6 +17,15 @@
   </p:sldIdLst>
   <p:sldSz cx="12192000" cy="6858000"/>
   <p:notesSz cx="6858000" cy="9144000"/>
+  <p:custShowLst>
+    <p:custShow name="Custom Show 1" id="0">
+      <p:sldLst>
+        <p:sld r:id="rId3"/>
+        <p:sld r:id="rId5"/>
+        <p:sld r:id="rId6"/>
+      </p:sldLst>
+    </p:custShow>
+  </p:custShowLst>
   <p:defaultTextStyle>
     <a:defPPr>
       <a:defRPr lang="en-US"/>
@@ -132,8 +144,37 @@
         </p14:section>
       </p14:sectionLst>
     </p:ext>
+    <p:ext uri="{EFAFB233-063F-42B5-8137-9DF3F51BA10A}">
+      <p15:sldGuideLst xmlns:p15="http://schemas.microsoft.com/office/powerpoint/2012/main"/>
+    </p:ext>
+    <p:ext uri="{2D200454-40CA-4A62-9FC3-DE9A4176ACB9}">
+      <p15:notesGuideLst xmlns:p15="http://schemas.microsoft.com/office/powerpoint/2012/main">
+        <p15:guide id="1" orient="horz" pos="2880" userDrawn="1">
+          <p15:clr>
+            <a:srgbClr val="A4A3A4"/>
+          </p15:clr>
+        </p15:guide>
+        <p15:guide id="2" pos="2160" userDrawn="1">
+          <p15:clr>
+            <a:srgbClr val="A4A3A4"/>
+          </p15:clr>
+        </p15:guide>
+      </p15:notesGuideLst>
+    </p:ext>
   </p:extLst>
 </p:presentation>
+</file>
+
+<file path=ppt/commentAuthors.xml><?xml version="1.0" encoding="utf-8"?>
+<p:cmAuthorLst xmlns:a="http://schemas.openxmlformats.org/drawingml/2006/main" xmlns:r="http://schemas.openxmlformats.org/officeDocument/2006/relationships" xmlns:p="http://schemas.openxmlformats.org/presentationml/2006/main">
+  <p:cmAuthor id="1" name="Microsoft account" initials="Ma" lastIdx="1" clrIdx="0">
+    <p:extLst>
+      <p:ext uri="{19B8F6BF-5375-455C-9EA6-DF929625EA0E}">
+        <p15:presenceInfo xmlns:p15="http://schemas.microsoft.com/office/powerpoint/2012/main" userId="040e6e0fdfb340f6" providerId="Windows Live"/>
+      </p:ext>
+    </p:extLst>
+  </p:cmAuthor>
+</p:cmAuthorLst>
 </file>
 
 <file path=ppt/diagrams/colors1.xml><?xml version="1.0" encoding="utf-8"?>
@@ -1065,6 +1106,13 @@
         </dgm:presLayoutVars>
       </dgm:prSet>
       <dgm:spPr/>
+      <dgm:t>
+        <a:bodyPr/>
+        <a:lstStyle/>
+        <a:p>
+          <a:endParaRPr lang="en-US"/>
+        </a:p>
+      </dgm:t>
     </dgm:pt>
     <dgm:pt modelId="{5E548111-2294-4C05-A420-AEF0944DBE3B}" type="pres">
       <dgm:prSet presAssocID="{5DE04D94-D48F-456F-A705-8758C5A97529}" presName="levelTx" presStyleLbl="revTx" presStyleIdx="0" presStyleCnt="0">
@@ -1074,6 +1122,13 @@
         </dgm:presLayoutVars>
       </dgm:prSet>
       <dgm:spPr/>
+      <dgm:t>
+        <a:bodyPr/>
+        <a:lstStyle/>
+        <a:p>
+          <a:endParaRPr lang="en-US"/>
+        </a:p>
+      </dgm:t>
     </dgm:pt>
     <dgm:pt modelId="{C96FB425-B113-4496-8ADB-15F94B8166D4}" type="pres">
       <dgm:prSet presAssocID="{640A234A-EB26-4497-BC4E-C36C76070B99}" presName="Name8" presStyleCnt="0"/>
@@ -1087,6 +1142,13 @@
         </dgm:presLayoutVars>
       </dgm:prSet>
       <dgm:spPr/>
+      <dgm:t>
+        <a:bodyPr/>
+        <a:lstStyle/>
+        <a:p>
+          <a:endParaRPr lang="en-US"/>
+        </a:p>
+      </dgm:t>
     </dgm:pt>
     <dgm:pt modelId="{07F03458-F52A-4528-B7ED-87C4C7FD38B6}" type="pres">
       <dgm:prSet presAssocID="{640A234A-EB26-4497-BC4E-C36C76070B99}" presName="levelTx" presStyleLbl="revTx" presStyleIdx="0" presStyleCnt="0">
@@ -1096,6 +1158,13 @@
         </dgm:presLayoutVars>
       </dgm:prSet>
       <dgm:spPr/>
+      <dgm:t>
+        <a:bodyPr/>
+        <a:lstStyle/>
+        <a:p>
+          <a:endParaRPr lang="en-US"/>
+        </a:p>
+      </dgm:t>
     </dgm:pt>
   </dgm:ptLst>
   <dgm:cxnLst>
@@ -2661,6 +2730,440 @@
 </dgm:styleDef>
 </file>
 
+<file path=ppt/notesMasters/notesMaster1.xml><?xml version="1.0" encoding="utf-8"?>
+<p:notesMaster xmlns:a="http://schemas.openxmlformats.org/drawingml/2006/main" xmlns:r="http://schemas.openxmlformats.org/officeDocument/2006/relationships" xmlns:p="http://schemas.openxmlformats.org/presentationml/2006/main">
+  <p:cSld>
+    <p:bg>
+      <p:bgRef idx="1001">
+        <a:schemeClr val="bg1"/>
+      </p:bgRef>
+    </p:bg>
+    <p:spTree>
+      <p:nvGrpSpPr>
+        <p:cNvPr id="1" name=""/>
+        <p:cNvGrpSpPr/>
+        <p:nvPr/>
+      </p:nvGrpSpPr>
+      <p:grpSpPr>
+        <a:xfrm>
+          <a:off x="0" y="0"/>
+          <a:ext cx="0" cy="0"/>
+          <a:chOff x="0" y="0"/>
+          <a:chExt cx="0" cy="0"/>
+        </a:xfrm>
+      </p:grpSpPr>
+      <p:sp>
+        <p:nvSpPr>
+          <p:cNvPr id="2" name="Header Placeholder 1"/>
+          <p:cNvSpPr>
+            <a:spLocks noGrp="1"/>
+          </p:cNvSpPr>
+          <p:nvPr>
+            <p:ph type="hdr" sz="quarter"/>
+          </p:nvPr>
+        </p:nvSpPr>
+        <p:spPr>
+          <a:xfrm>
+            <a:off x="0" y="0"/>
+            <a:ext cx="2971800" cy="458788"/>
+          </a:xfrm>
+          <a:prstGeom prst="rect">
+            <a:avLst/>
+          </a:prstGeom>
+        </p:spPr>
+        <p:txBody>
+          <a:bodyPr vert="horz" lIns="91440" tIns="45720" rIns="91440" bIns="45720" rtlCol="0"/>
+          <a:lstStyle>
+            <a:lvl1pPr algn="l">
+              <a:defRPr sz="1200"/>
+            </a:lvl1pPr>
+          </a:lstStyle>
+          <a:p>
+            <a:endParaRPr lang="en-US"/>
+          </a:p>
+        </p:txBody>
+      </p:sp>
+      <p:sp>
+        <p:nvSpPr>
+          <p:cNvPr id="3" name="Date Placeholder 2"/>
+          <p:cNvSpPr>
+            <a:spLocks noGrp="1"/>
+          </p:cNvSpPr>
+          <p:nvPr>
+            <p:ph type="dt" idx="1"/>
+          </p:nvPr>
+        </p:nvSpPr>
+        <p:spPr>
+          <a:xfrm>
+            <a:off x="3884613" y="0"/>
+            <a:ext cx="2971800" cy="458788"/>
+          </a:xfrm>
+          <a:prstGeom prst="rect">
+            <a:avLst/>
+          </a:prstGeom>
+        </p:spPr>
+        <p:txBody>
+          <a:bodyPr vert="horz" lIns="91440" tIns="45720" rIns="91440" bIns="45720" rtlCol="0"/>
+          <a:lstStyle>
+            <a:lvl1pPr algn="r">
+              <a:defRPr sz="1200"/>
+            </a:lvl1pPr>
+          </a:lstStyle>
+          <a:p>
+            <a:fld id="{D4C0932D-F244-4AA5-AF71-A5CEBBD06877}" type="datetimeFigureOut">
+              <a:rPr lang="en-US" smtClean="0"/>
+              <a:t>8/4/2023</a:t>
+            </a:fld>
+            <a:endParaRPr lang="en-US"/>
+          </a:p>
+        </p:txBody>
+      </p:sp>
+      <p:sp>
+        <p:nvSpPr>
+          <p:cNvPr id="4" name="Slide Image Placeholder 3"/>
+          <p:cNvSpPr>
+            <a:spLocks noGrp="1" noRot="1" noChangeAspect="1"/>
+          </p:cNvSpPr>
+          <p:nvPr>
+            <p:ph type="sldImg" idx="2"/>
+          </p:nvPr>
+        </p:nvSpPr>
+        <p:spPr>
+          <a:xfrm>
+            <a:off x="685800" y="1143000"/>
+            <a:ext cx="5486400" cy="3086100"/>
+          </a:xfrm>
+          <a:prstGeom prst="rect">
+            <a:avLst/>
+          </a:prstGeom>
+          <a:noFill/>
+          <a:ln w="12700">
+            <a:solidFill>
+              <a:prstClr val="black"/>
+            </a:solidFill>
+          </a:ln>
+        </p:spPr>
+        <p:txBody>
+          <a:bodyPr vert="horz" lIns="91440" tIns="45720" rIns="91440" bIns="45720" rtlCol="0" anchor="ctr"/>
+          <a:lstStyle/>
+          <a:p>
+            <a:endParaRPr lang="en-US"/>
+          </a:p>
+        </p:txBody>
+      </p:sp>
+      <p:sp>
+        <p:nvSpPr>
+          <p:cNvPr id="5" name="Notes Placeholder 4"/>
+          <p:cNvSpPr>
+            <a:spLocks noGrp="1"/>
+          </p:cNvSpPr>
+          <p:nvPr>
+            <p:ph type="body" sz="quarter" idx="3"/>
+          </p:nvPr>
+        </p:nvSpPr>
+        <p:spPr>
+          <a:xfrm>
+            <a:off x="685800" y="4400550"/>
+            <a:ext cx="5486400" cy="3600450"/>
+          </a:xfrm>
+          <a:prstGeom prst="rect">
+            <a:avLst/>
+          </a:prstGeom>
+        </p:spPr>
+        <p:txBody>
+          <a:bodyPr vert="horz" lIns="91440" tIns="45720" rIns="91440" bIns="45720" rtlCol="0"/>
+          <a:lstStyle/>
+          <a:p>
+            <a:pPr lvl="0"/>
+            <a:r>
+              <a:rPr lang="en-US" smtClean="0"/>
+              <a:t>Click to edit Master text styles</a:t>
+            </a:r>
+          </a:p>
+          <a:p>
+            <a:pPr lvl="1"/>
+            <a:r>
+              <a:rPr lang="en-US" smtClean="0"/>
+              <a:t>Second level</a:t>
+            </a:r>
+          </a:p>
+          <a:p>
+            <a:pPr lvl="2"/>
+            <a:r>
+              <a:rPr lang="en-US" smtClean="0"/>
+              <a:t>Third level</a:t>
+            </a:r>
+          </a:p>
+          <a:p>
+            <a:pPr lvl="3"/>
+            <a:r>
+              <a:rPr lang="en-US" smtClean="0"/>
+              <a:t>Fourth level</a:t>
+            </a:r>
+          </a:p>
+          <a:p>
+            <a:pPr lvl="4"/>
+            <a:r>
+              <a:rPr lang="en-US" smtClean="0"/>
+              <a:t>Fifth level</a:t>
+            </a:r>
+            <a:endParaRPr lang="en-US"/>
+          </a:p>
+        </p:txBody>
+      </p:sp>
+      <p:sp>
+        <p:nvSpPr>
+          <p:cNvPr id="6" name="Footer Placeholder 5"/>
+          <p:cNvSpPr>
+            <a:spLocks noGrp="1"/>
+          </p:cNvSpPr>
+          <p:nvPr>
+            <p:ph type="ftr" sz="quarter" idx="4"/>
+          </p:nvPr>
+        </p:nvSpPr>
+        <p:spPr>
+          <a:xfrm>
+            <a:off x="0" y="8685213"/>
+            <a:ext cx="2971800" cy="458787"/>
+          </a:xfrm>
+          <a:prstGeom prst="rect">
+            <a:avLst/>
+          </a:prstGeom>
+        </p:spPr>
+        <p:txBody>
+          <a:bodyPr vert="horz" lIns="91440" tIns="45720" rIns="91440" bIns="45720" rtlCol="0" anchor="b"/>
+          <a:lstStyle>
+            <a:lvl1pPr algn="l">
+              <a:defRPr sz="1200"/>
+            </a:lvl1pPr>
+          </a:lstStyle>
+          <a:p>
+            <a:endParaRPr lang="en-US"/>
+          </a:p>
+        </p:txBody>
+      </p:sp>
+      <p:sp>
+        <p:nvSpPr>
+          <p:cNvPr id="7" name="Slide Number Placeholder 6"/>
+          <p:cNvSpPr>
+            <a:spLocks noGrp="1"/>
+          </p:cNvSpPr>
+          <p:nvPr>
+            <p:ph type="sldNum" sz="quarter" idx="5"/>
+          </p:nvPr>
+        </p:nvSpPr>
+        <p:spPr>
+          <a:xfrm>
+            <a:off x="3884613" y="8685213"/>
+            <a:ext cx="2971800" cy="458787"/>
+          </a:xfrm>
+          <a:prstGeom prst="rect">
+            <a:avLst/>
+          </a:prstGeom>
+        </p:spPr>
+        <p:txBody>
+          <a:bodyPr vert="horz" lIns="91440" tIns="45720" rIns="91440" bIns="45720" rtlCol="0" anchor="b"/>
+          <a:lstStyle>
+            <a:lvl1pPr algn="r">
+              <a:defRPr sz="1200"/>
+            </a:lvl1pPr>
+          </a:lstStyle>
+          <a:p>
+            <a:fld id="{8FCEB636-B310-484E-97F3-541CC62BD849}" type="slidenum">
+              <a:rPr lang="en-US" smtClean="0"/>
+              <a:t>‹#›</a:t>
+            </a:fld>
+            <a:endParaRPr lang="en-US"/>
+          </a:p>
+        </p:txBody>
+      </p:sp>
+    </p:spTree>
+    <p:extLst>
+      <p:ext uri="{BB962C8B-B14F-4D97-AF65-F5344CB8AC3E}">
+        <p14:creationId xmlns:p14="http://schemas.microsoft.com/office/powerpoint/2010/main" val="3498839635"/>
+      </p:ext>
+    </p:extLst>
+  </p:cSld>
+  <p:clrMap bg1="lt1" tx1="dk1" bg2="lt2" tx2="dk2" accent1="accent1" accent2="accent2" accent3="accent3" accent4="accent4" accent5="accent5" accent6="accent6" hlink="hlink" folHlink="folHlink"/>
+  <p:notesStyle>
+    <a:lvl1pPr marL="0" algn="l" defTabSz="914400" rtl="0" eaLnBrk="1" latinLnBrk="0" hangingPunct="1">
+      <a:defRPr sz="1200" kern="1200">
+        <a:solidFill>
+          <a:schemeClr val="tx1"/>
+        </a:solidFill>
+        <a:latin typeface="+mn-lt"/>
+        <a:ea typeface="+mn-ea"/>
+        <a:cs typeface="+mn-cs"/>
+      </a:defRPr>
+    </a:lvl1pPr>
+    <a:lvl2pPr marL="457200" algn="l" defTabSz="914400" rtl="0" eaLnBrk="1" latinLnBrk="0" hangingPunct="1">
+      <a:defRPr sz="1200" kern="1200">
+        <a:solidFill>
+          <a:schemeClr val="tx1"/>
+        </a:solidFill>
+        <a:latin typeface="+mn-lt"/>
+        <a:ea typeface="+mn-ea"/>
+        <a:cs typeface="+mn-cs"/>
+      </a:defRPr>
+    </a:lvl2pPr>
+    <a:lvl3pPr marL="914400" algn="l" defTabSz="914400" rtl="0" eaLnBrk="1" latinLnBrk="0" hangingPunct="1">
+      <a:defRPr sz="1200" kern="1200">
+        <a:solidFill>
+          <a:schemeClr val="tx1"/>
+        </a:solidFill>
+        <a:latin typeface="+mn-lt"/>
+        <a:ea typeface="+mn-ea"/>
+        <a:cs typeface="+mn-cs"/>
+      </a:defRPr>
+    </a:lvl3pPr>
+    <a:lvl4pPr marL="1371600" algn="l" defTabSz="914400" rtl="0" eaLnBrk="1" latinLnBrk="0" hangingPunct="1">
+      <a:defRPr sz="1200" kern="1200">
+        <a:solidFill>
+          <a:schemeClr val="tx1"/>
+        </a:solidFill>
+        <a:latin typeface="+mn-lt"/>
+        <a:ea typeface="+mn-ea"/>
+        <a:cs typeface="+mn-cs"/>
+      </a:defRPr>
+    </a:lvl4pPr>
+    <a:lvl5pPr marL="1828800" algn="l" defTabSz="914400" rtl="0" eaLnBrk="1" latinLnBrk="0" hangingPunct="1">
+      <a:defRPr sz="1200" kern="1200">
+        <a:solidFill>
+          <a:schemeClr val="tx1"/>
+        </a:solidFill>
+        <a:latin typeface="+mn-lt"/>
+        <a:ea typeface="+mn-ea"/>
+        <a:cs typeface="+mn-cs"/>
+      </a:defRPr>
+    </a:lvl5pPr>
+    <a:lvl6pPr marL="2286000" algn="l" defTabSz="914400" rtl="0" eaLnBrk="1" latinLnBrk="0" hangingPunct="1">
+      <a:defRPr sz="1200" kern="1200">
+        <a:solidFill>
+          <a:schemeClr val="tx1"/>
+        </a:solidFill>
+        <a:latin typeface="+mn-lt"/>
+        <a:ea typeface="+mn-ea"/>
+        <a:cs typeface="+mn-cs"/>
+      </a:defRPr>
+    </a:lvl6pPr>
+    <a:lvl7pPr marL="2743200" algn="l" defTabSz="914400" rtl="0" eaLnBrk="1" latinLnBrk="0" hangingPunct="1">
+      <a:defRPr sz="1200" kern="1200">
+        <a:solidFill>
+          <a:schemeClr val="tx1"/>
+        </a:solidFill>
+        <a:latin typeface="+mn-lt"/>
+        <a:ea typeface="+mn-ea"/>
+        <a:cs typeface="+mn-cs"/>
+      </a:defRPr>
+    </a:lvl7pPr>
+    <a:lvl8pPr marL="3200400" algn="l" defTabSz="914400" rtl="0" eaLnBrk="1" latinLnBrk="0" hangingPunct="1">
+      <a:defRPr sz="1200" kern="1200">
+        <a:solidFill>
+          <a:schemeClr val="tx1"/>
+        </a:solidFill>
+        <a:latin typeface="+mn-lt"/>
+        <a:ea typeface="+mn-ea"/>
+        <a:cs typeface="+mn-cs"/>
+      </a:defRPr>
+    </a:lvl8pPr>
+    <a:lvl9pPr marL="3657600" algn="l" defTabSz="914400" rtl="0" eaLnBrk="1" latinLnBrk="0" hangingPunct="1">
+      <a:defRPr sz="1200" kern="1200">
+        <a:solidFill>
+          <a:schemeClr val="tx1"/>
+        </a:solidFill>
+        <a:latin typeface="+mn-lt"/>
+        <a:ea typeface="+mn-ea"/>
+        <a:cs typeface="+mn-cs"/>
+      </a:defRPr>
+    </a:lvl9pPr>
+  </p:notesStyle>
+</p:notesMaster>
+</file>
+
+<file path=ppt/notesSlides/notesSlide1.xml><?xml version="1.0" encoding="utf-8"?>
+<p:notes xmlns:a="http://schemas.openxmlformats.org/drawingml/2006/main" xmlns:r="http://schemas.openxmlformats.org/officeDocument/2006/relationships" xmlns:p="http://schemas.openxmlformats.org/presentationml/2006/main">
+  <p:cSld>
+    <p:spTree>
+      <p:nvGrpSpPr>
+        <p:cNvPr id="1" name=""/>
+        <p:cNvGrpSpPr/>
+        <p:nvPr/>
+      </p:nvGrpSpPr>
+      <p:grpSpPr>
+        <a:xfrm>
+          <a:off x="0" y="0"/>
+          <a:ext cx="0" cy="0"/>
+          <a:chOff x="0" y="0"/>
+          <a:chExt cx="0" cy="0"/>
+        </a:xfrm>
+      </p:grpSpPr>
+      <p:sp>
+        <p:nvSpPr>
+          <p:cNvPr id="2" name="Slide Image Placeholder 1"/>
+          <p:cNvSpPr>
+            <a:spLocks noGrp="1" noRot="1" noChangeAspect="1"/>
+          </p:cNvSpPr>
+          <p:nvPr>
+            <p:ph type="sldImg"/>
+          </p:nvPr>
+        </p:nvSpPr>
+        <p:spPr/>
+      </p:sp>
+      <p:sp>
+        <p:nvSpPr>
+          <p:cNvPr id="3" name="Notes Placeholder 2"/>
+          <p:cNvSpPr>
+            <a:spLocks noGrp="1"/>
+          </p:cNvSpPr>
+          <p:nvPr>
+            <p:ph type="body" idx="1"/>
+          </p:nvPr>
+        </p:nvSpPr>
+        <p:spPr/>
+        <p:txBody>
+          <a:bodyPr/>
+          <a:lstStyle/>
+          <a:p>
+            <a:endParaRPr lang="en-US" dirty="0"/>
+          </a:p>
+        </p:txBody>
+      </p:sp>
+      <p:sp>
+        <p:nvSpPr>
+          <p:cNvPr id="4" name="Slide Number Placeholder 3"/>
+          <p:cNvSpPr>
+            <a:spLocks noGrp="1"/>
+          </p:cNvSpPr>
+          <p:nvPr>
+            <p:ph type="sldNum" sz="quarter" idx="10"/>
+          </p:nvPr>
+        </p:nvSpPr>
+        <p:spPr/>
+        <p:txBody>
+          <a:bodyPr/>
+          <a:lstStyle/>
+          <a:p>
+            <a:fld id="{8FCEB636-B310-484E-97F3-541CC62BD849}" type="slidenum">
+              <a:rPr lang="en-US" smtClean="0"/>
+              <a:t>3</a:t>
+            </a:fld>
+            <a:endParaRPr lang="en-US"/>
+          </a:p>
+        </p:txBody>
+      </p:sp>
+    </p:spTree>
+    <p:extLst>
+      <p:ext uri="{BB962C8B-B14F-4D97-AF65-F5344CB8AC3E}">
+        <p14:creationId xmlns:p14="http://schemas.microsoft.com/office/powerpoint/2010/main" val="2013206240"/>
+      </p:ext>
+    </p:extLst>
+  </p:cSld>
+  <p:clrMapOvr>
+    <a:masterClrMapping/>
+  </p:clrMapOvr>
+</p:notes>
+</file>
+
 <file path=ppt/slideLayouts/slideLayout1.xml><?xml version="1.0" encoding="utf-8"?>
 <p:sldLayout xmlns:a="http://schemas.openxmlformats.org/drawingml/2006/main" xmlns:r="http://schemas.openxmlformats.org/officeDocument/2006/relationships" xmlns:p="http://schemas.openxmlformats.org/presentationml/2006/main" type="title" preserve="1">
   <p:cSld name="Title Slide">
@@ -2831,9 +3334,9 @@
           <a:p>
             <a:fld id="{113EFB61-8F14-4F5A-B83D-44344941FBA4}" type="datetimeFigureOut">
               <a:rPr lang="en-US" smtClean="0"/>
-              <a:t>8/3/2023</a:t>
+              <a:t>8/4/2023</a:t>
             </a:fld>
-            <a:endParaRPr lang="en-US"/>
+            <a:endParaRPr lang="en-US" dirty="0"/>
           </a:p>
         </p:txBody>
       </p:sp>
@@ -2857,7 +3360,7 @@
           <a:bodyPr/>
           <a:lstStyle/>
           <a:p>
-            <a:endParaRPr lang="en-US"/>
+            <a:endParaRPr lang="en-US" dirty="0"/>
           </a:p>
         </p:txBody>
       </p:sp>
@@ -2885,7 +3388,7 @@
               <a:rPr lang="en-US" smtClean="0"/>
               <a:t>‹#›</a:t>
             </a:fld>
-            <a:endParaRPr lang="en-US"/>
+            <a:endParaRPr lang="en-US" dirty="0"/>
           </a:p>
         </p:txBody>
       </p:sp>
@@ -3009,7 +3512,7 @@
           </a:lstStyle>
           <a:p>
             <a:r>
-              <a:rPr lang="en-US" smtClean="0"/>
+              <a:rPr lang="en-US" dirty="0" smtClean="0"/>
               <a:t>Click icon to add picture</a:t>
             </a:r>
             <a:endParaRPr lang="en-US" dirty="0"/>
@@ -3098,9 +3601,9 @@
           <a:p>
             <a:fld id="{113EFB61-8F14-4F5A-B83D-44344941FBA4}" type="datetimeFigureOut">
               <a:rPr lang="en-US" smtClean="0"/>
-              <a:t>8/3/2023</a:t>
+              <a:t>8/4/2023</a:t>
             </a:fld>
-            <a:endParaRPr lang="en-US"/>
+            <a:endParaRPr lang="en-US" dirty="0"/>
           </a:p>
         </p:txBody>
       </p:sp>
@@ -3119,7 +3622,7 @@
           <a:bodyPr/>
           <a:lstStyle/>
           <a:p>
-            <a:endParaRPr lang="en-US"/>
+            <a:endParaRPr lang="en-US" dirty="0"/>
           </a:p>
         </p:txBody>
       </p:sp>
@@ -3142,7 +3645,7 @@
               <a:rPr lang="en-US" smtClean="0"/>
               <a:t>‹#›</a:t>
             </a:fld>
-            <a:endParaRPr lang="en-US"/>
+            <a:endParaRPr lang="en-US" dirty="0"/>
           </a:p>
         </p:txBody>
       </p:sp>
@@ -3329,9 +3832,9 @@
           <a:p>
             <a:fld id="{113EFB61-8F14-4F5A-B83D-44344941FBA4}" type="datetimeFigureOut">
               <a:rPr lang="en-US" smtClean="0"/>
-              <a:t>8/3/2023</a:t>
+              <a:t>8/4/2023</a:t>
             </a:fld>
-            <a:endParaRPr lang="en-US"/>
+            <a:endParaRPr lang="en-US" dirty="0"/>
           </a:p>
         </p:txBody>
       </p:sp>
@@ -3355,7 +3858,7 @@
           <a:bodyPr/>
           <a:lstStyle/>
           <a:p>
-            <a:endParaRPr lang="en-US"/>
+            <a:endParaRPr lang="en-US" dirty="0"/>
           </a:p>
         </p:txBody>
       </p:sp>
@@ -3383,7 +3886,7 @@
               <a:rPr lang="en-US" smtClean="0"/>
               <a:t>‹#›</a:t>
             </a:fld>
-            <a:endParaRPr lang="en-US"/>
+            <a:endParaRPr lang="en-US" dirty="0"/>
           </a:p>
         </p:txBody>
       </p:sp>
@@ -3639,9 +4142,9 @@
           <a:p>
             <a:fld id="{113EFB61-8F14-4F5A-B83D-44344941FBA4}" type="datetimeFigureOut">
               <a:rPr lang="en-US" smtClean="0"/>
-              <a:t>8/3/2023</a:t>
+              <a:t>8/4/2023</a:t>
             </a:fld>
-            <a:endParaRPr lang="en-US"/>
+            <a:endParaRPr lang="en-US" dirty="0"/>
           </a:p>
         </p:txBody>
       </p:sp>
@@ -3665,7 +4168,7 @@
           <a:bodyPr/>
           <a:lstStyle/>
           <a:p>
-            <a:endParaRPr lang="en-US"/>
+            <a:endParaRPr lang="en-US" dirty="0"/>
           </a:p>
         </p:txBody>
       </p:sp>
@@ -3693,7 +4196,7 @@
               <a:rPr lang="en-US" smtClean="0"/>
               <a:t>‹#›</a:t>
             </a:fld>
-            <a:endParaRPr lang="en-US"/>
+            <a:endParaRPr lang="en-US" dirty="0"/>
           </a:p>
         </p:txBody>
       </p:sp>
@@ -4112,9 +4615,9 @@
           <a:p>
             <a:fld id="{113EFB61-8F14-4F5A-B83D-44344941FBA4}" type="datetimeFigureOut">
               <a:rPr lang="en-US" smtClean="0"/>
-              <a:t>8/3/2023</a:t>
+              <a:t>8/4/2023</a:t>
             </a:fld>
-            <a:endParaRPr lang="en-US"/>
+            <a:endParaRPr lang="en-US" dirty="0"/>
           </a:p>
         </p:txBody>
       </p:sp>
@@ -4138,7 +4641,7 @@
           <a:bodyPr/>
           <a:lstStyle/>
           <a:p>
-            <a:endParaRPr lang="en-US"/>
+            <a:endParaRPr lang="en-US" dirty="0"/>
           </a:p>
         </p:txBody>
       </p:sp>
@@ -4166,7 +4669,7 @@
               <a:rPr lang="en-US" smtClean="0"/>
               <a:t>‹#›</a:t>
             </a:fld>
-            <a:endParaRPr lang="en-US"/>
+            <a:endParaRPr lang="en-US" dirty="0"/>
           </a:p>
         </p:txBody>
       </p:sp>
@@ -4659,9 +5162,9 @@
           <a:p>
             <a:fld id="{113EFB61-8F14-4F5A-B83D-44344941FBA4}" type="datetimeFigureOut">
               <a:rPr lang="en-US" smtClean="0"/>
-              <a:t>8/3/2023</a:t>
+              <a:t>8/4/2023</a:t>
             </a:fld>
-            <a:endParaRPr lang="en-US"/>
+            <a:endParaRPr lang="en-US" dirty="0"/>
           </a:p>
         </p:txBody>
       </p:sp>
@@ -4680,7 +5183,7 @@
           <a:bodyPr/>
           <a:lstStyle/>
           <a:p>
-            <a:endParaRPr lang="en-US"/>
+            <a:endParaRPr lang="en-US" dirty="0"/>
           </a:p>
         </p:txBody>
       </p:sp>
@@ -4703,7 +5206,7 @@
               <a:rPr lang="en-US" smtClean="0"/>
               <a:t>‹#›</a:t>
             </a:fld>
-            <a:endParaRPr lang="en-US"/>
+            <a:endParaRPr lang="en-US" dirty="0"/>
           </a:p>
         </p:txBody>
       </p:sp>
@@ -4908,7 +5411,7 @@
           </a:lstStyle>
           <a:p>
             <a:r>
-              <a:rPr lang="en-US" smtClean="0"/>
+              <a:rPr lang="en-US" dirty="0" smtClean="0"/>
               <a:t>Click icon to add picture</a:t>
             </a:r>
             <a:endParaRPr lang="en-US" dirty="0"/>
@@ -5125,7 +5628,7 @@
           </a:lstStyle>
           <a:p>
             <a:r>
-              <a:rPr lang="en-US" smtClean="0"/>
+              <a:rPr lang="en-US" dirty="0" smtClean="0"/>
               <a:t>Click icon to add picture</a:t>
             </a:r>
             <a:endParaRPr lang="en-US" dirty="0"/>
@@ -5342,7 +5845,7 @@
           </a:lstStyle>
           <a:p>
             <a:r>
-              <a:rPr lang="en-US" smtClean="0"/>
+              <a:rPr lang="en-US" dirty="0" smtClean="0"/>
               <a:t>Click icon to add picture</a:t>
             </a:r>
             <a:endParaRPr lang="en-US" dirty="0"/>
@@ -5433,9 +5936,9 @@
           <a:p>
             <a:fld id="{113EFB61-8F14-4F5A-B83D-44344941FBA4}" type="datetimeFigureOut">
               <a:rPr lang="en-US" smtClean="0"/>
-              <a:t>8/3/2023</a:t>
+              <a:t>8/4/2023</a:t>
             </a:fld>
-            <a:endParaRPr lang="en-US"/>
+            <a:endParaRPr lang="en-US" dirty="0"/>
           </a:p>
         </p:txBody>
       </p:sp>
@@ -5454,7 +5957,7 @@
           <a:bodyPr/>
           <a:lstStyle/>
           <a:p>
-            <a:endParaRPr lang="en-US"/>
+            <a:endParaRPr lang="en-US" dirty="0"/>
           </a:p>
         </p:txBody>
       </p:sp>
@@ -5477,7 +5980,7 @@
               <a:rPr lang="en-US" smtClean="0"/>
               <a:t>‹#›</a:t>
             </a:fld>
-            <a:endParaRPr lang="en-US"/>
+            <a:endParaRPr lang="en-US" dirty="0"/>
           </a:p>
         </p:txBody>
       </p:sp>
@@ -5608,9 +6111,9 @@
           <a:p>
             <a:fld id="{113EFB61-8F14-4F5A-B83D-44344941FBA4}" type="datetimeFigureOut">
               <a:rPr lang="en-US" smtClean="0"/>
-              <a:t>8/3/2023</a:t>
+              <a:t>8/4/2023</a:t>
             </a:fld>
-            <a:endParaRPr lang="en-US"/>
+            <a:endParaRPr lang="en-US" dirty="0"/>
           </a:p>
         </p:txBody>
       </p:sp>
@@ -5629,7 +6132,7 @@
           <a:bodyPr/>
           <a:lstStyle/>
           <a:p>
-            <a:endParaRPr lang="en-US"/>
+            <a:endParaRPr lang="en-US" dirty="0"/>
           </a:p>
         </p:txBody>
       </p:sp>
@@ -5652,7 +6155,7 @@
               <a:rPr lang="en-US" smtClean="0"/>
               <a:t>‹#›</a:t>
             </a:fld>
-            <a:endParaRPr lang="en-US"/>
+            <a:endParaRPr lang="en-US" dirty="0"/>
           </a:p>
         </p:txBody>
       </p:sp>
@@ -5831,9 +6334,9 @@
           <a:p>
             <a:fld id="{113EFB61-8F14-4F5A-B83D-44344941FBA4}" type="datetimeFigureOut">
               <a:rPr lang="en-US" smtClean="0"/>
-              <a:t>8/3/2023</a:t>
+              <a:t>8/4/2023</a:t>
             </a:fld>
-            <a:endParaRPr lang="en-US"/>
+            <a:endParaRPr lang="en-US" dirty="0"/>
           </a:p>
         </p:txBody>
       </p:sp>
@@ -5857,7 +6360,7 @@
           <a:bodyPr/>
           <a:lstStyle/>
           <a:p>
-            <a:endParaRPr lang="en-US"/>
+            <a:endParaRPr lang="en-US" dirty="0"/>
           </a:p>
         </p:txBody>
       </p:sp>
@@ -5885,7 +6388,7 @@
               <a:rPr lang="en-US" smtClean="0"/>
               <a:t>‹#›</a:t>
             </a:fld>
-            <a:endParaRPr lang="en-US"/>
+            <a:endParaRPr lang="en-US" dirty="0"/>
           </a:p>
         </p:txBody>
       </p:sp>
@@ -6011,9 +6514,9 @@
           <a:p>
             <a:fld id="{113EFB61-8F14-4F5A-B83D-44344941FBA4}" type="datetimeFigureOut">
               <a:rPr lang="en-US" smtClean="0"/>
-              <a:t>8/3/2023</a:t>
+              <a:t>8/4/2023</a:t>
             </a:fld>
-            <a:endParaRPr lang="en-US"/>
+            <a:endParaRPr lang="en-US" dirty="0"/>
           </a:p>
         </p:txBody>
       </p:sp>
@@ -6032,7 +6535,7 @@
           <a:bodyPr/>
           <a:lstStyle/>
           <a:p>
-            <a:endParaRPr lang="en-US"/>
+            <a:endParaRPr lang="en-US" dirty="0"/>
           </a:p>
         </p:txBody>
       </p:sp>
@@ -6055,7 +6558,7 @@
               <a:rPr lang="en-US" smtClean="0"/>
               <a:t>‹#›</a:t>
             </a:fld>
-            <a:endParaRPr lang="en-US"/>
+            <a:endParaRPr lang="en-US" dirty="0"/>
           </a:p>
         </p:txBody>
       </p:sp>
@@ -6300,9 +6803,9 @@
           <a:p>
             <a:fld id="{113EFB61-8F14-4F5A-B83D-44344941FBA4}" type="datetimeFigureOut">
               <a:rPr lang="en-US" smtClean="0"/>
-              <a:t>8/3/2023</a:t>
+              <a:t>8/4/2023</a:t>
             </a:fld>
-            <a:endParaRPr lang="en-US"/>
+            <a:endParaRPr lang="en-US" dirty="0"/>
           </a:p>
         </p:txBody>
       </p:sp>
@@ -6326,7 +6829,7 @@
           <a:bodyPr/>
           <a:lstStyle/>
           <a:p>
-            <a:endParaRPr lang="en-US"/>
+            <a:endParaRPr lang="en-US" dirty="0"/>
           </a:p>
         </p:txBody>
       </p:sp>
@@ -6354,7 +6857,7 @@
               <a:rPr lang="en-US" smtClean="0"/>
               <a:t>‹#›</a:t>
             </a:fld>
-            <a:endParaRPr lang="en-US"/>
+            <a:endParaRPr lang="en-US" dirty="0"/>
           </a:p>
         </p:txBody>
       </p:sp>
@@ -6542,9 +7045,9 @@
           <a:p>
             <a:fld id="{113EFB61-8F14-4F5A-B83D-44344941FBA4}" type="datetimeFigureOut">
               <a:rPr lang="en-US" smtClean="0"/>
-              <a:t>8/3/2023</a:t>
+              <a:t>8/4/2023</a:t>
             </a:fld>
-            <a:endParaRPr lang="en-US"/>
+            <a:endParaRPr lang="en-US" dirty="0"/>
           </a:p>
         </p:txBody>
       </p:sp>
@@ -6563,7 +7066,7 @@
           <a:bodyPr/>
           <a:lstStyle/>
           <a:p>
-            <a:endParaRPr lang="en-US"/>
+            <a:endParaRPr lang="en-US" dirty="0"/>
           </a:p>
         </p:txBody>
       </p:sp>
@@ -6586,7 +7089,7 @@
               <a:rPr lang="en-US" smtClean="0"/>
               <a:t>‹#›</a:t>
             </a:fld>
-            <a:endParaRPr lang="en-US"/>
+            <a:endParaRPr lang="en-US" dirty="0"/>
           </a:p>
         </p:txBody>
       </p:sp>
@@ -6921,9 +7424,9 @@
           <a:p>
             <a:fld id="{113EFB61-8F14-4F5A-B83D-44344941FBA4}" type="datetimeFigureOut">
               <a:rPr lang="en-US" smtClean="0"/>
-              <a:t>8/3/2023</a:t>
+              <a:t>8/4/2023</a:t>
             </a:fld>
-            <a:endParaRPr lang="en-US"/>
+            <a:endParaRPr lang="en-US" dirty="0"/>
           </a:p>
         </p:txBody>
       </p:sp>
@@ -6942,7 +7445,7 @@
           <a:bodyPr/>
           <a:lstStyle/>
           <a:p>
-            <a:endParaRPr lang="en-US"/>
+            <a:endParaRPr lang="en-US" dirty="0"/>
           </a:p>
         </p:txBody>
       </p:sp>
@@ -6965,7 +7468,7 @@
               <a:rPr lang="en-US" smtClean="0"/>
               <a:t>‹#›</a:t>
             </a:fld>
-            <a:endParaRPr lang="en-US"/>
+            <a:endParaRPr lang="en-US" dirty="0"/>
           </a:p>
         </p:txBody>
       </p:sp>
@@ -7039,9 +7542,9 @@
           <a:p>
             <a:fld id="{113EFB61-8F14-4F5A-B83D-44344941FBA4}" type="datetimeFigureOut">
               <a:rPr lang="en-US" smtClean="0"/>
-              <a:t>8/3/2023</a:t>
+              <a:t>8/4/2023</a:t>
             </a:fld>
-            <a:endParaRPr lang="en-US"/>
+            <a:endParaRPr lang="en-US" dirty="0"/>
           </a:p>
         </p:txBody>
       </p:sp>
@@ -7060,7 +7563,7 @@
           <a:bodyPr/>
           <a:lstStyle/>
           <a:p>
-            <a:endParaRPr lang="en-US"/>
+            <a:endParaRPr lang="en-US" dirty="0"/>
           </a:p>
         </p:txBody>
       </p:sp>
@@ -7083,7 +7586,7 @@
               <a:rPr lang="en-US" smtClean="0"/>
               <a:t>‹#›</a:t>
             </a:fld>
-            <a:endParaRPr lang="en-US"/>
+            <a:endParaRPr lang="en-US" dirty="0"/>
           </a:p>
         </p:txBody>
       </p:sp>
@@ -7134,9 +7637,9 @@
           <a:p>
             <a:fld id="{113EFB61-8F14-4F5A-B83D-44344941FBA4}" type="datetimeFigureOut">
               <a:rPr lang="en-US" smtClean="0"/>
-              <a:t>8/3/2023</a:t>
+              <a:t>8/4/2023</a:t>
             </a:fld>
-            <a:endParaRPr lang="en-US"/>
+            <a:endParaRPr lang="en-US" dirty="0"/>
           </a:p>
         </p:txBody>
       </p:sp>
@@ -7155,7 +7658,7 @@
           <a:bodyPr/>
           <a:lstStyle/>
           <a:p>
-            <a:endParaRPr lang="en-US"/>
+            <a:endParaRPr lang="en-US" dirty="0"/>
           </a:p>
         </p:txBody>
       </p:sp>
@@ -7178,7 +7681,7 @@
               <a:rPr lang="en-US" smtClean="0"/>
               <a:t>‹#›</a:t>
             </a:fld>
-            <a:endParaRPr lang="en-US"/>
+            <a:endParaRPr lang="en-US" dirty="0"/>
           </a:p>
         </p:txBody>
       </p:sp>
@@ -7383,9 +7886,9 @@
           <a:p>
             <a:fld id="{113EFB61-8F14-4F5A-B83D-44344941FBA4}" type="datetimeFigureOut">
               <a:rPr lang="en-US" smtClean="0"/>
-              <a:t>8/3/2023</a:t>
+              <a:t>8/4/2023</a:t>
             </a:fld>
-            <a:endParaRPr lang="en-US"/>
+            <a:endParaRPr lang="en-US" dirty="0"/>
           </a:p>
         </p:txBody>
       </p:sp>
@@ -7404,7 +7907,7 @@
           <a:bodyPr/>
           <a:lstStyle/>
           <a:p>
-            <a:endParaRPr lang="en-US"/>
+            <a:endParaRPr lang="en-US" dirty="0"/>
           </a:p>
         </p:txBody>
       </p:sp>
@@ -7427,7 +7930,7 @@
               <a:rPr lang="en-US" smtClean="0"/>
               <a:t>‹#›</a:t>
             </a:fld>
-            <a:endParaRPr lang="en-US"/>
+            <a:endParaRPr lang="en-US" dirty="0"/>
           </a:p>
         </p:txBody>
       </p:sp>
@@ -7551,7 +8054,7 @@
           </a:lstStyle>
           <a:p>
             <a:r>
-              <a:rPr lang="en-US" smtClean="0"/>
+              <a:rPr lang="en-US" dirty="0" smtClean="0"/>
               <a:t>Click icon to add picture</a:t>
             </a:r>
             <a:endParaRPr lang="en-US" dirty="0"/>
@@ -7640,9 +8143,9 @@
           <a:p>
             <a:fld id="{113EFB61-8F14-4F5A-B83D-44344941FBA4}" type="datetimeFigureOut">
               <a:rPr lang="en-US" smtClean="0"/>
-              <a:t>8/3/2023</a:t>
+              <a:t>8/4/2023</a:t>
             </a:fld>
-            <a:endParaRPr lang="en-US"/>
+            <a:endParaRPr lang="en-US" dirty="0"/>
           </a:p>
         </p:txBody>
       </p:sp>
@@ -7661,7 +8164,7 @@
           <a:bodyPr/>
           <a:lstStyle/>
           <a:p>
-            <a:endParaRPr lang="en-US"/>
+            <a:endParaRPr lang="en-US" dirty="0"/>
           </a:p>
         </p:txBody>
       </p:sp>
@@ -7684,7 +8187,7 @@
               <a:rPr lang="en-US" smtClean="0"/>
               <a:t>‹#›</a:t>
             </a:fld>
-            <a:endParaRPr lang="en-US"/>
+            <a:endParaRPr lang="en-US" dirty="0"/>
           </a:p>
         </p:txBody>
       </p:sp>
@@ -7883,9 +8386,9 @@
           <a:p>
             <a:fld id="{113EFB61-8F14-4F5A-B83D-44344941FBA4}" type="datetimeFigureOut">
               <a:rPr lang="en-US" smtClean="0"/>
-              <a:t>8/3/2023</a:t>
+              <a:t>8/4/2023</a:t>
             </a:fld>
-            <a:endParaRPr lang="en-US"/>
+            <a:endParaRPr lang="en-US" dirty="0"/>
           </a:p>
         </p:txBody>
       </p:sp>
@@ -7922,7 +8425,7 @@
             </a:lvl1pPr>
           </a:lstStyle>
           <a:p>
-            <a:endParaRPr lang="en-US"/>
+            <a:endParaRPr lang="en-US" dirty="0"/>
           </a:p>
         </p:txBody>
       </p:sp>
@@ -7963,7 +8466,7 @@
               <a:rPr lang="en-US" smtClean="0"/>
               <a:t>‹#›</a:t>
             </a:fld>
-            <a:endParaRPr lang="en-US"/>
+            <a:endParaRPr lang="en-US" dirty="0"/>
           </a:p>
         </p:txBody>
       </p:sp>
@@ -8350,13 +8853,13 @@
   <p:clrMapOvr>
     <a:masterClrMapping/>
   </p:clrMapOvr>
-  <mc:AlternateContent xmlns:mc="http://schemas.openxmlformats.org/markup-compatibility/2006">
-    <mc:Choice xmlns:p15="http://schemas.microsoft.com/office/powerpoint/2012/main" Requires="p15">
+  <mc:AlternateContent xmlns:mc="http://schemas.openxmlformats.org/markup-compatibility/2006" xmlns:p15="http://schemas.microsoft.com/office/powerpoint/2012/main">
+    <mc:Choice Requires="p15">
       <p:transition xmlns:p14="http://schemas.microsoft.com/office/powerpoint/2010/main" spd="slow" p14:dur="6000">
         <p15:prstTrans prst="curtains"/>
       </p:transition>
     </mc:Choice>
-    <mc:Fallback>
+    <mc:Fallback xmlns="">
       <p:transition spd="slow">
         <p:fade/>
       </p:transition>
@@ -8826,13 +9329,13 @@
   <p:clrMapOvr>
     <a:masterClrMapping/>
   </p:clrMapOvr>
-  <mc:AlternateContent xmlns:mc="http://schemas.openxmlformats.org/markup-compatibility/2006">
-    <mc:Choice xmlns:p14="http://schemas.microsoft.com/office/powerpoint/2010/main" Requires="p14">
+  <mc:AlternateContent xmlns:mc="http://schemas.openxmlformats.org/markup-compatibility/2006" xmlns:p14="http://schemas.microsoft.com/office/powerpoint/2010/main">
+    <mc:Choice Requires="p14">
       <p:transition spd="slow" p14:dur="2500">
         <p:checker/>
       </p:transition>
     </mc:Choice>
-    <mc:Fallback>
+    <mc:Fallback xmlns="">
       <p:transition spd="slow">
         <p:checker/>
       </p:transition>
@@ -9627,12 +10130,12 @@
               <a:t>There are two parts </a:t>
             </a:r>
             <a:r>
-              <a:rPr lang="en-US" dirty="0" err="1" smtClean="0"/>
-              <a:t>ofd</a:t>
+              <a:rPr lang="en-US" dirty="0" smtClean="0"/>
+              <a:t>of </a:t>
             </a:r>
             <a:r>
               <a:rPr lang="en-US" dirty="0" smtClean="0"/>
-              <a:t> computer </a:t>
+              <a:t>computer </a:t>
             </a:r>
           </a:p>
           <a:p>
@@ -9674,13 +10177,13 @@
   <p:clrMapOvr>
     <a:masterClrMapping/>
   </p:clrMapOvr>
-  <mc:AlternateContent xmlns:mc="http://schemas.openxmlformats.org/markup-compatibility/2006">
-    <mc:Choice xmlns:p14="http://schemas.microsoft.com/office/powerpoint/2010/main" Requires="p14">
+  <mc:AlternateContent xmlns:mc="http://schemas.openxmlformats.org/markup-compatibility/2006" xmlns:p14="http://schemas.microsoft.com/office/powerpoint/2010/main">
+    <mc:Choice Requires="p14">
       <p:transition spd="slow" p14:dur="4400">
         <p14:honeycomb/>
       </p:transition>
     </mc:Choice>
-    <mc:Fallback>
+    <mc:Fallback xmlns="">
       <p:transition spd="slow">
         <p:fade/>
       </p:transition>
@@ -10717,13 +11220,13 @@
   <p:clrMapOvr>
     <a:masterClrMapping/>
   </p:clrMapOvr>
-  <mc:AlternateContent xmlns:mc="http://schemas.openxmlformats.org/markup-compatibility/2006">
-    <mc:Choice xmlns:p14="http://schemas.microsoft.com/office/powerpoint/2010/main" Requires="p14">
+  <mc:AlternateContent xmlns:mc="http://schemas.openxmlformats.org/markup-compatibility/2006" xmlns:p14="http://schemas.microsoft.com/office/powerpoint/2010/main">
+    <mc:Choice Requires="p14">
       <p:transition spd="slow" p14:dur="1250">
         <p14:flip dir="r"/>
       </p:transition>
     </mc:Choice>
-    <mc:Fallback>
+    <mc:Fallback xmlns="">
       <p:transition spd="slow">
         <p:fade/>
       </p:transition>
@@ -11148,4 +11651,265 @@
     </a:ext>
   </a:extLst>
 </a:theme>
+</file>
+
+<file path=ppt/theme/theme2.xml><?xml version="1.0" encoding="utf-8"?>
+<a:theme xmlns:a="http://schemas.openxmlformats.org/drawingml/2006/main" name="Office Theme">
+  <a:themeElements>
+    <a:clrScheme name="Office">
+      <a:dk1>
+        <a:sysClr val="windowText" lastClr="000000"/>
+      </a:dk1>
+      <a:lt1>
+        <a:sysClr val="window" lastClr="FFFFFF"/>
+      </a:lt1>
+      <a:dk2>
+        <a:srgbClr val="44546A"/>
+      </a:dk2>
+      <a:lt2>
+        <a:srgbClr val="E7E6E6"/>
+      </a:lt2>
+      <a:accent1>
+        <a:srgbClr val="5B9BD5"/>
+      </a:accent1>
+      <a:accent2>
+        <a:srgbClr val="ED7D31"/>
+      </a:accent2>
+      <a:accent3>
+        <a:srgbClr val="A5A5A5"/>
+      </a:accent3>
+      <a:accent4>
+        <a:srgbClr val="FFC000"/>
+      </a:accent4>
+      <a:accent5>
+        <a:srgbClr val="4472C4"/>
+      </a:accent5>
+      <a:accent6>
+        <a:srgbClr val="70AD47"/>
+      </a:accent6>
+      <a:hlink>
+        <a:srgbClr val="0563C1"/>
+      </a:hlink>
+      <a:folHlink>
+        <a:srgbClr val="954F72"/>
+      </a:folHlink>
+    </a:clrScheme>
+    <a:fontScheme name="Office">
+      <a:majorFont>
+        <a:latin typeface="Calibri Light" panose="020F0302020204030204"/>
+        <a:ea typeface=""/>
+        <a:cs typeface=""/>
+        <a:font script="Jpan" typeface="ＭＳ Ｐゴシック"/>
+        <a:font script="Hang" typeface="맑은 고딕"/>
+        <a:font script="Hans" typeface="宋体"/>
+        <a:font script="Hant" typeface="新細明體"/>
+        <a:font script="Arab" typeface="Times New Roman"/>
+        <a:font script="Hebr" typeface="Times New Roman"/>
+        <a:font script="Thai" typeface="Angsana New"/>
+        <a:font script="Ethi" typeface="Nyala"/>
+        <a:font script="Beng" typeface="Vrinda"/>
+        <a:font script="Gujr" typeface="Shruti"/>
+        <a:font script="Khmr" typeface="MoolBoran"/>
+        <a:font script="Knda" typeface="Tunga"/>
+        <a:font script="Guru" typeface="Raavi"/>
+        <a:font script="Cans" typeface="Euphemia"/>
+        <a:font script="Cher" typeface="Plantagenet Cherokee"/>
+        <a:font script="Yiii" typeface="Microsoft Yi Baiti"/>
+        <a:font script="Tibt" typeface="Microsoft Himalaya"/>
+        <a:font script="Thaa" typeface="MV Boli"/>
+        <a:font script="Deva" typeface="Mangal"/>
+        <a:font script="Telu" typeface="Gautami"/>
+        <a:font script="Taml" typeface="Latha"/>
+        <a:font script="Syrc" typeface="Estrangelo Edessa"/>
+        <a:font script="Orya" typeface="Kalinga"/>
+        <a:font script="Mlym" typeface="Kartika"/>
+        <a:font script="Laoo" typeface="DokChampa"/>
+        <a:font script="Sinh" typeface="Iskoola Pota"/>
+        <a:font script="Mong" typeface="Mongolian Baiti"/>
+        <a:font script="Viet" typeface="Times New Roman"/>
+        <a:font script="Uigh" typeface="Microsoft Uighur"/>
+        <a:font script="Geor" typeface="Sylfaen"/>
+      </a:majorFont>
+      <a:minorFont>
+        <a:latin typeface="Calibri" panose="020F0502020204030204"/>
+        <a:ea typeface=""/>
+        <a:cs typeface=""/>
+        <a:font script="Jpan" typeface="ＭＳ Ｐゴシック"/>
+        <a:font script="Hang" typeface="맑은 고딕"/>
+        <a:font script="Hans" typeface="宋体"/>
+        <a:font script="Hant" typeface="新細明體"/>
+        <a:font script="Arab" typeface="Arial"/>
+        <a:font script="Hebr" typeface="Arial"/>
+        <a:font script="Thai" typeface="Cordia New"/>
+        <a:font script="Ethi" typeface="Nyala"/>
+        <a:font script="Beng" typeface="Vrinda"/>
+        <a:font script="Gujr" typeface="Shruti"/>
+        <a:font script="Khmr" typeface="DaunPenh"/>
+        <a:font script="Knda" typeface="Tunga"/>
+        <a:font script="Guru" typeface="Raavi"/>
+        <a:font script="Cans" typeface="Euphemia"/>
+        <a:font script="Cher" typeface="Plantagenet Cherokee"/>
+        <a:font script="Yiii" typeface="Microsoft Yi Baiti"/>
+        <a:font script="Tibt" typeface="Microsoft Himalaya"/>
+        <a:font script="Thaa" typeface="MV Boli"/>
+        <a:font script="Deva" typeface="Mangal"/>
+        <a:font script="Telu" typeface="Gautami"/>
+        <a:font script="Taml" typeface="Latha"/>
+        <a:font script="Syrc" typeface="Estrangelo Edessa"/>
+        <a:font script="Orya" typeface="Kalinga"/>
+        <a:font script="Mlym" typeface="Kartika"/>
+        <a:font script="Laoo" typeface="DokChampa"/>
+        <a:font script="Sinh" typeface="Iskoola Pota"/>
+        <a:font script="Mong" typeface="Mongolian Baiti"/>
+        <a:font script="Viet" typeface="Arial"/>
+        <a:font script="Uigh" typeface="Microsoft Uighur"/>
+        <a:font script="Geor" typeface="Sylfaen"/>
+      </a:minorFont>
+    </a:fontScheme>
+    <a:fmtScheme name="Office">
+      <a:fillStyleLst>
+        <a:solidFill>
+          <a:schemeClr val="phClr"/>
+        </a:solidFill>
+        <a:gradFill rotWithShape="1">
+          <a:gsLst>
+            <a:gs pos="0">
+              <a:schemeClr val="phClr">
+                <a:lumMod val="110000"/>
+                <a:satMod val="105000"/>
+                <a:tint val="67000"/>
+              </a:schemeClr>
+            </a:gs>
+            <a:gs pos="50000">
+              <a:schemeClr val="phClr">
+                <a:lumMod val="105000"/>
+                <a:satMod val="103000"/>
+                <a:tint val="73000"/>
+              </a:schemeClr>
+            </a:gs>
+            <a:gs pos="100000">
+              <a:schemeClr val="phClr">
+                <a:lumMod val="105000"/>
+                <a:satMod val="109000"/>
+                <a:tint val="81000"/>
+              </a:schemeClr>
+            </a:gs>
+          </a:gsLst>
+          <a:lin ang="5400000" scaled="0"/>
+        </a:gradFill>
+        <a:gradFill rotWithShape="1">
+          <a:gsLst>
+            <a:gs pos="0">
+              <a:schemeClr val="phClr">
+                <a:satMod val="103000"/>
+                <a:lumMod val="102000"/>
+                <a:tint val="94000"/>
+              </a:schemeClr>
+            </a:gs>
+            <a:gs pos="50000">
+              <a:schemeClr val="phClr">
+                <a:satMod val="110000"/>
+                <a:lumMod val="100000"/>
+                <a:shade val="100000"/>
+              </a:schemeClr>
+            </a:gs>
+            <a:gs pos="100000">
+              <a:schemeClr val="phClr">
+                <a:lumMod val="99000"/>
+                <a:satMod val="120000"/>
+                <a:shade val="78000"/>
+              </a:schemeClr>
+            </a:gs>
+          </a:gsLst>
+          <a:lin ang="5400000" scaled="0"/>
+        </a:gradFill>
+      </a:fillStyleLst>
+      <a:lnStyleLst>
+        <a:ln w="6350" cap="flat" cmpd="sng" algn="ctr">
+          <a:solidFill>
+            <a:schemeClr val="phClr"/>
+          </a:solidFill>
+          <a:prstDash val="solid"/>
+          <a:miter lim="800000"/>
+        </a:ln>
+        <a:ln w="12700" cap="flat" cmpd="sng" algn="ctr">
+          <a:solidFill>
+            <a:schemeClr val="phClr"/>
+          </a:solidFill>
+          <a:prstDash val="solid"/>
+          <a:miter lim="800000"/>
+        </a:ln>
+        <a:ln w="19050" cap="flat" cmpd="sng" algn="ctr">
+          <a:solidFill>
+            <a:schemeClr val="phClr"/>
+          </a:solidFill>
+          <a:prstDash val="solid"/>
+          <a:miter lim="800000"/>
+        </a:ln>
+      </a:lnStyleLst>
+      <a:effectStyleLst>
+        <a:effectStyle>
+          <a:effectLst/>
+        </a:effectStyle>
+        <a:effectStyle>
+          <a:effectLst/>
+        </a:effectStyle>
+        <a:effectStyle>
+          <a:effectLst>
+            <a:outerShdw blurRad="57150" dist="19050" dir="5400000" algn="ctr" rotWithShape="0">
+              <a:srgbClr val="000000">
+                <a:alpha val="63000"/>
+              </a:srgbClr>
+            </a:outerShdw>
+          </a:effectLst>
+        </a:effectStyle>
+      </a:effectStyleLst>
+      <a:bgFillStyleLst>
+        <a:solidFill>
+          <a:schemeClr val="phClr"/>
+        </a:solidFill>
+        <a:solidFill>
+          <a:schemeClr val="phClr">
+            <a:tint val="95000"/>
+            <a:satMod val="170000"/>
+          </a:schemeClr>
+        </a:solidFill>
+        <a:gradFill rotWithShape="1">
+          <a:gsLst>
+            <a:gs pos="0">
+              <a:schemeClr val="phClr">
+                <a:tint val="93000"/>
+                <a:satMod val="150000"/>
+                <a:shade val="98000"/>
+                <a:lumMod val="102000"/>
+              </a:schemeClr>
+            </a:gs>
+            <a:gs pos="50000">
+              <a:schemeClr val="phClr">
+                <a:tint val="98000"/>
+                <a:satMod val="130000"/>
+                <a:shade val="90000"/>
+                <a:lumMod val="103000"/>
+              </a:schemeClr>
+            </a:gs>
+            <a:gs pos="100000">
+              <a:schemeClr val="phClr">
+                <a:shade val="63000"/>
+                <a:satMod val="120000"/>
+              </a:schemeClr>
+            </a:gs>
+          </a:gsLst>
+          <a:lin ang="5400000" scaled="0"/>
+        </a:gradFill>
+      </a:bgFillStyleLst>
+    </a:fmtScheme>
+  </a:themeElements>
+  <a:objectDefaults/>
+  <a:extraClrSchemeLst/>
+  <a:extLst>
+    <a:ext uri="{05A4C25C-085E-4340-85A3-A5531E510DB2}">
+      <thm15:themeFamily xmlns:thm15="http://schemas.microsoft.com/office/thememl/2012/main" name="Office Theme" id="{62F939B6-93AF-4DB8-9C6B-D6C7DFDC589F}" vid="{4A3C46E8-61CC-4603-A589-7422A47A8E4A}"/>
+    </a:ext>
+  </a:extLst>
+</a:theme>
 </file>
</xml_diff>